<commit_message>
Updated Capstone 1 final reports and fixed issues in predictive model notebooks
</commit_message>
<xml_diff>
--- a/Capstone1/Capstone1_Reports/Capstone1_Presentation.pptx
+++ b/Capstone1/Capstone1_Reports/Capstone1_Presentation.pptx
@@ -246,7 +246,7 @@
           <a:p>
             <a:fld id="{872BFC85-49E4-447A-A7E3-16153CB2FE2A}" type="datetimeFigureOut">
               <a:rPr lang="en-US" smtClean="0"/>
-              <a:t>6/25/19</a:t>
+              <a:t>7/2/19</a:t>
             </a:fld>
             <a:endParaRPr lang="en-US" dirty="0"/>
           </a:p>
@@ -423,7 +423,7 @@
           <a:p>
             <a:fld id="{1071B50E-4C60-4F9E-B773-52059170945B}" type="datetimeFigureOut">
               <a:rPr lang="en-US" noProof="0" smtClean="0"/>
-              <a:t>6/25/19</a:t>
+              <a:t>7/2/19</a:t>
             </a:fld>
             <a:endParaRPr lang="en-US" noProof="0" dirty="0"/>
           </a:p>
@@ -904,10 +904,9 @@
           </a:lstStyle>
           <a:p>
             <a:r>
-              <a:rPr lang="en-US" noProof="0"/>
+              <a:rPr lang="en-US" noProof="0" dirty="0"/>
               <a:t>Click icon to add picture</a:t>
             </a:r>
-            <a:endParaRPr lang="en-US" noProof="0" dirty="0"/>
           </a:p>
         </p:txBody>
       </p:sp>
@@ -5125,10 +5124,9 @@
           </a:lstStyle>
           <a:p>
             <a:r>
-              <a:rPr lang="en-US" noProof="0"/>
+              <a:rPr lang="en-US" noProof="0" dirty="0"/>
               <a:t>Click icon to add picture</a:t>
             </a:r>
-            <a:endParaRPr lang="en-US" noProof="0" dirty="0"/>
           </a:p>
         </p:txBody>
       </p:sp>
@@ -6614,10 +6612,9 @@
           </a:lstStyle>
           <a:p>
             <a:r>
-              <a:rPr lang="en-US" noProof="0"/>
+              <a:rPr lang="en-US" noProof="0" dirty="0"/>
               <a:t>Click icon to add picture</a:t>
             </a:r>
-            <a:endParaRPr lang="en-US" noProof="0" dirty="0"/>
           </a:p>
         </p:txBody>
       </p:sp>
@@ -7349,10 +7346,9 @@
           </a:lstStyle>
           <a:p>
             <a:r>
-              <a:rPr lang="en-US" noProof="0"/>
+              <a:rPr lang="en-US" noProof="0" dirty="0"/>
               <a:t>Click icon to add picture</a:t>
             </a:r>
-            <a:endParaRPr lang="en-US" noProof="0" dirty="0"/>
           </a:p>
         </p:txBody>
       </p:sp>
@@ -7597,10 +7593,9 @@
           </a:lstStyle>
           <a:p>
             <a:r>
-              <a:rPr lang="en-US" noProof="0"/>
+              <a:rPr lang="en-US" noProof="0" dirty="0"/>
               <a:t>Click icon to add picture</a:t>
             </a:r>
-            <a:endParaRPr lang="en-US" noProof="0" dirty="0"/>
           </a:p>
         </p:txBody>
       </p:sp>
@@ -9460,10 +9455,9 @@
           <a:p>
             <a:pPr lvl="0"/>
             <a:r>
-              <a:rPr lang="en-US" noProof="0"/>
+              <a:rPr lang="en-US" noProof="0" dirty="0"/>
               <a:t>Click icon to add chart</a:t>
             </a:r>
-            <a:endParaRPr lang="en-US" noProof="0" dirty="0"/>
           </a:p>
         </p:txBody>
       </p:sp>
@@ -9561,10 +9555,9 @@
           <a:p>
             <a:pPr lvl="0"/>
             <a:r>
-              <a:rPr lang="en-US" noProof="0"/>
+              <a:rPr lang="en-US" noProof="0" dirty="0"/>
               <a:t>Click icon to add table</a:t>
             </a:r>
-            <a:endParaRPr lang="en-US" noProof="0" dirty="0"/>
           </a:p>
         </p:txBody>
       </p:sp>
@@ -12087,10 +12080,9 @@
           </a:lstStyle>
           <a:p>
             <a:r>
-              <a:rPr lang="en-US" noProof="0"/>
+              <a:rPr lang="en-US" noProof="0" dirty="0"/>
               <a:t>Click icon to add picture</a:t>
             </a:r>
-            <a:endParaRPr lang="en-US" noProof="0" dirty="0"/>
           </a:p>
         </p:txBody>
       </p:sp>
@@ -13538,23 +13530,7 @@
                   <a:schemeClr val="bg1"/>
                 </a:solidFill>
               </a:rPr>
-              <a:t>The </a:t>
-            </a:r>
-            <a:r>
-              <a:rPr lang="en-US" dirty="0" err="1">
-                <a:solidFill>
-                  <a:schemeClr val="bg1"/>
-                </a:solidFill>
-              </a:rPr>
-              <a:t>ElasticNet</a:t>
-            </a:r>
-            <a:r>
-              <a:rPr lang="en-US" dirty="0">
-                <a:solidFill>
-                  <a:schemeClr val="bg1"/>
-                </a:solidFill>
-              </a:rPr>
-              <a:t> Regression (w/ Transformed Target) model was selected has the best model for this project due as it performance on testing data which increases confidence in predictions made on future data. This model also allows for great interpretability by identifying the most influential variables</a:t>
+              <a:t>The ElasticNet Regression (w/ Transformed Target) model was selected has the best model for this project due as it performance on testing data which increases confidence in predictions made on future data. This model also allows for great interpretability by identifying the most influential variables</a:t>
             </a:r>
           </a:p>
         </p:txBody>
@@ -13574,14 +13550,14 @@
           <p:nvPr>
             <p:extLst>
               <p:ext uri="{D42A27DB-BD31-4B8C-83A1-F6EECF244321}">
-                <p14:modId xmlns:p14="http://schemas.microsoft.com/office/powerpoint/2010/main" val="760812470"/>
+                <p14:modId xmlns:p14="http://schemas.microsoft.com/office/powerpoint/2010/main" val="3839501490"/>
               </p:ext>
             </p:extLst>
           </p:nvPr>
         </p:nvGraphicFramePr>
         <p:xfrm>
-          <a:off x="1822183" y="2464599"/>
-          <a:ext cx="8214064" cy="2740915"/>
+          <a:off x="1822183" y="2464600"/>
+          <a:ext cx="8214064" cy="2741530"/>
         </p:xfrm>
         <a:graphic>
           <a:graphicData uri="http://schemas.openxmlformats.org/drawingml/2006/table">
@@ -13624,7 +13600,7 @@
                   </a:extLst>
                 </a:gridCol>
               </a:tblGrid>
-              <a:tr h="249687">
+              <a:tr h="259285">
                 <a:tc>
                   <a:txBody>
                     <a:bodyPr/>
@@ -13882,7 +13858,7 @@
                   </a:ext>
                 </a:extLst>
               </a:tr>
-              <a:tr h="249687">
+              <a:tr h="203164">
                 <a:tc>
                   <a:txBody>
                     <a:bodyPr/>
@@ -13900,7 +13876,7 @@
                         </a:spcAft>
                       </a:pPr>
                       <a:r>
-                        <a:rPr lang="en-US" sz="1300" b="1">
+                        <a:rPr lang="en-US" sz="1300" b="1" dirty="0">
                           <a:solidFill>
                             <a:srgbClr val="FFFFFF"/>
                           </a:solidFill>
@@ -13911,7 +13887,7 @@
                         </a:rPr>
                         <a:t>Model</a:t>
                       </a:r>
-                      <a:endParaRPr lang="en-US" sz="1300">
+                      <a:endParaRPr lang="en-US" sz="1300" dirty="0">
                         <a:effectLst/>
                         <a:latin typeface="Arial" panose="020B0604020202020204" pitchFamily="34" charset="0"/>
                         <a:ea typeface="Arial" panose="020B0604020202020204" pitchFamily="34" charset="0"/>
@@ -14075,31 +14051,7 @@
                           <a:ea typeface="Calibri" panose="020F0502020204030204" pitchFamily="34" charset="0"/>
                           <a:cs typeface="Calibri" panose="020F0502020204030204" pitchFamily="34" charset="0"/>
                         </a:rPr>
-                        <a:t>MAE (</a:t>
-                      </a:r>
-                      <a:r>
-                        <a:rPr lang="en-US" sz="1300" b="1" dirty="0" err="1">
-                          <a:solidFill>
-                            <a:srgbClr val="FFFFFF"/>
-                          </a:solidFill>
-                          <a:effectLst/>
-                          <a:latin typeface="Calibri" panose="020F0502020204030204" pitchFamily="34" charset="0"/>
-                          <a:ea typeface="Calibri" panose="020F0502020204030204" pitchFamily="34" charset="0"/>
-                          <a:cs typeface="Calibri" panose="020F0502020204030204" pitchFamily="34" charset="0"/>
-                        </a:rPr>
-                        <a:t>kBTU</a:t>
-                      </a:r>
-                      <a:r>
-                        <a:rPr lang="en-US" sz="1300" b="1" dirty="0">
-                          <a:solidFill>
-                            <a:srgbClr val="FFFFFF"/>
-                          </a:solidFill>
-                          <a:effectLst/>
-                          <a:latin typeface="Calibri" panose="020F0502020204030204" pitchFamily="34" charset="0"/>
-                          <a:ea typeface="Calibri" panose="020F0502020204030204" pitchFamily="34" charset="0"/>
-                          <a:cs typeface="Calibri" panose="020F0502020204030204" pitchFamily="34" charset="0"/>
-                        </a:rPr>
-                        <a:t>)</a:t>
+                        <a:t>MAE (kBTU)</a:t>
                       </a:r>
                       <a:endParaRPr lang="en-US" sz="1300" dirty="0">
                         <a:effectLst/>
@@ -14265,31 +14217,7 @@
                           <a:ea typeface="Calibri" panose="020F0502020204030204" pitchFamily="34" charset="0"/>
                           <a:cs typeface="Calibri" panose="020F0502020204030204" pitchFamily="34" charset="0"/>
                         </a:rPr>
-                        <a:t>MAE (</a:t>
-                      </a:r>
-                      <a:r>
-                        <a:rPr lang="en-US" sz="1300" b="1" dirty="0" err="1">
-                          <a:solidFill>
-                            <a:srgbClr val="FFFFFF"/>
-                          </a:solidFill>
-                          <a:effectLst/>
-                          <a:latin typeface="Calibri" panose="020F0502020204030204" pitchFamily="34" charset="0"/>
-                          <a:ea typeface="Calibri" panose="020F0502020204030204" pitchFamily="34" charset="0"/>
-                          <a:cs typeface="Calibri" panose="020F0502020204030204" pitchFamily="34" charset="0"/>
-                        </a:rPr>
-                        <a:t>kBTU</a:t>
-                      </a:r>
-                      <a:r>
-                        <a:rPr lang="en-US" sz="1300" b="1" dirty="0">
-                          <a:solidFill>
-                            <a:srgbClr val="FFFFFF"/>
-                          </a:solidFill>
-                          <a:effectLst/>
-                          <a:latin typeface="Calibri" panose="020F0502020204030204" pitchFamily="34" charset="0"/>
-                          <a:ea typeface="Calibri" panose="020F0502020204030204" pitchFamily="34" charset="0"/>
-                          <a:cs typeface="Calibri" panose="020F0502020204030204" pitchFamily="34" charset="0"/>
-                        </a:rPr>
-                        <a:t>)</a:t>
+                        <a:t>MAE (kBTU)</a:t>
                       </a:r>
                       <a:endParaRPr lang="en-US" sz="1300" dirty="0">
                         <a:effectLst/>
@@ -14346,7 +14274,7 @@
                   </a:ext>
                 </a:extLst>
               </a:tr>
-              <a:tr h="543142">
+              <a:tr h="441940">
                 <a:tc>
                   <a:txBody>
                     <a:bodyPr/>
@@ -14364,7 +14292,339 @@
                         </a:spcAft>
                       </a:pPr>
                       <a:r>
-                        <a:rPr lang="en-US" sz="1300">
+                        <a:rPr lang="en-US" sz="1300" dirty="0">
+                          <a:effectLst/>
+                          <a:latin typeface="+mn-lt"/>
+                          <a:ea typeface="Arial" panose="020B0604020202020204" pitchFamily="34" charset="0"/>
+                        </a:rPr>
+                        <a:t>Baseline</a:t>
+                      </a:r>
+                    </a:p>
+                  </a:txBody>
+                  <a:tcPr marL="79117" marR="79117" marT="0" marB="0" anchor="ctr">
+                    <a:lnL w="12700" cap="flat" cmpd="sng" algn="ctr">
+                      <a:solidFill>
+                        <a:srgbClr val="000000"/>
+                      </a:solidFill>
+                      <a:prstDash val="solid"/>
+                      <a:round/>
+                      <a:headEnd type="none" w="med" len="med"/>
+                      <a:tailEnd type="none" w="med" len="med"/>
+                    </a:lnL>
+                    <a:lnR w="12700" cap="flat" cmpd="sng" algn="ctr">
+                      <a:solidFill>
+                        <a:srgbClr val="000000"/>
+                      </a:solidFill>
+                      <a:prstDash val="solid"/>
+                      <a:round/>
+                      <a:headEnd type="none" w="med" len="med"/>
+                      <a:tailEnd type="none" w="med" len="med"/>
+                    </a:lnR>
+                    <a:lnT w="12700" cap="flat" cmpd="sng" algn="ctr">
+                      <a:solidFill>
+                        <a:srgbClr val="000000"/>
+                      </a:solidFill>
+                      <a:prstDash val="solid"/>
+                      <a:round/>
+                      <a:headEnd type="none" w="med" len="med"/>
+                      <a:tailEnd type="none" w="med" len="med"/>
+                    </a:lnT>
+                    <a:lnB w="12700" cap="flat" cmpd="sng" algn="ctr">
+                      <a:solidFill>
+                        <a:srgbClr val="000000"/>
+                      </a:solidFill>
+                      <a:prstDash val="solid"/>
+                      <a:round/>
+                      <a:headEnd type="none" w="med" len="med"/>
+                      <a:tailEnd type="none" w="med" len="med"/>
+                    </a:lnB>
+                  </a:tcPr>
+                </a:tc>
+                <a:tc>
+                  <a:txBody>
+                    <a:bodyPr/>
+                    <a:lstStyle/>
+                    <a:p>
+                      <a:pPr marL="0" marR="0" algn="ctr">
+                        <a:lnSpc>
+                          <a:spcPct val="115000"/>
+                        </a:lnSpc>
+                        <a:spcBef>
+                          <a:spcPts val="0"/>
+                        </a:spcBef>
+                        <a:spcAft>
+                          <a:spcPts val="0"/>
+                        </a:spcAft>
+                      </a:pPr>
+                      <a:r>
+                        <a:rPr lang="en-US" sz="1300" dirty="0">
+                          <a:effectLst/>
+                          <a:latin typeface="+mn-lt"/>
+                          <a:ea typeface="Arial" panose="020B0604020202020204" pitchFamily="34" charset="0"/>
+                        </a:rPr>
+                        <a:t>-3.9%</a:t>
+                      </a:r>
+                    </a:p>
+                  </a:txBody>
+                  <a:tcPr marL="79117" marR="79117" marT="0" marB="0" anchor="ctr">
+                    <a:lnL w="12700" cap="flat" cmpd="sng" algn="ctr">
+                      <a:solidFill>
+                        <a:srgbClr val="000000"/>
+                      </a:solidFill>
+                      <a:prstDash val="solid"/>
+                      <a:round/>
+                      <a:headEnd type="none" w="med" len="med"/>
+                      <a:tailEnd type="none" w="med" len="med"/>
+                    </a:lnL>
+                    <a:lnR w="12700" cap="flat" cmpd="sng" algn="ctr">
+                      <a:solidFill>
+                        <a:srgbClr val="000000"/>
+                      </a:solidFill>
+                      <a:prstDash val="solid"/>
+                      <a:round/>
+                      <a:headEnd type="none" w="med" len="med"/>
+                      <a:tailEnd type="none" w="med" len="med"/>
+                    </a:lnR>
+                    <a:lnT w="12700" cap="flat" cmpd="sng" algn="ctr">
+                      <a:solidFill>
+                        <a:srgbClr val="000000"/>
+                      </a:solidFill>
+                      <a:prstDash val="solid"/>
+                      <a:round/>
+                      <a:headEnd type="none" w="med" len="med"/>
+                      <a:tailEnd type="none" w="med" len="med"/>
+                    </a:lnT>
+                    <a:lnB w="12700" cap="flat" cmpd="sng" algn="ctr">
+                      <a:solidFill>
+                        <a:srgbClr val="000000"/>
+                      </a:solidFill>
+                      <a:prstDash val="solid"/>
+                      <a:round/>
+                      <a:headEnd type="none" w="med" len="med"/>
+                      <a:tailEnd type="none" w="med" len="med"/>
+                    </a:lnB>
+                  </a:tcPr>
+                </a:tc>
+                <a:tc>
+                  <a:txBody>
+                    <a:bodyPr/>
+                    <a:lstStyle/>
+                    <a:p>
+                      <a:pPr marL="0" marR="0" algn="ctr">
+                        <a:lnSpc>
+                          <a:spcPct val="115000"/>
+                        </a:lnSpc>
+                        <a:spcBef>
+                          <a:spcPts val="0"/>
+                        </a:spcBef>
+                        <a:spcAft>
+                          <a:spcPts val="0"/>
+                        </a:spcAft>
+                      </a:pPr>
+                      <a:r>
+                        <a:rPr lang="en-US" sz="1300" dirty="0">
+                          <a:effectLst/>
+                          <a:latin typeface="+mn-lt"/>
+                          <a:ea typeface="Arial" panose="020B0604020202020204" pitchFamily="34" charset="0"/>
+                        </a:rPr>
+                        <a:t>29,626</a:t>
+                      </a:r>
+                    </a:p>
+                  </a:txBody>
+                  <a:tcPr marL="79117" marR="79117" marT="0" marB="0" anchor="ctr">
+                    <a:lnL w="12700" cap="flat" cmpd="sng" algn="ctr">
+                      <a:solidFill>
+                        <a:srgbClr val="000000"/>
+                      </a:solidFill>
+                      <a:prstDash val="solid"/>
+                      <a:round/>
+                      <a:headEnd type="none" w="med" len="med"/>
+                      <a:tailEnd type="none" w="med" len="med"/>
+                    </a:lnL>
+                    <a:lnR w="12700" cap="flat" cmpd="sng" algn="ctr">
+                      <a:solidFill>
+                        <a:srgbClr val="000000"/>
+                      </a:solidFill>
+                      <a:prstDash val="solid"/>
+                      <a:round/>
+                      <a:headEnd type="none" w="med" len="med"/>
+                      <a:tailEnd type="none" w="med" len="med"/>
+                    </a:lnR>
+                    <a:lnT w="12700" cap="flat" cmpd="sng" algn="ctr">
+                      <a:solidFill>
+                        <a:srgbClr val="000000"/>
+                      </a:solidFill>
+                      <a:prstDash val="solid"/>
+                      <a:round/>
+                      <a:headEnd type="none" w="med" len="med"/>
+                      <a:tailEnd type="none" w="med" len="med"/>
+                    </a:lnT>
+                    <a:lnB w="12700" cap="flat" cmpd="sng" algn="ctr">
+                      <a:solidFill>
+                        <a:srgbClr val="000000"/>
+                      </a:solidFill>
+                      <a:prstDash val="solid"/>
+                      <a:round/>
+                      <a:headEnd type="none" w="med" len="med"/>
+                      <a:tailEnd type="none" w="med" len="med"/>
+                    </a:lnB>
+                  </a:tcPr>
+                </a:tc>
+                <a:tc>
+                  <a:txBody>
+                    <a:bodyPr/>
+                    <a:lstStyle/>
+                    <a:p>
+                      <a:pPr marL="0" marR="0" algn="ctr">
+                        <a:lnSpc>
+                          <a:spcPct val="115000"/>
+                        </a:lnSpc>
+                        <a:spcBef>
+                          <a:spcPts val="0"/>
+                        </a:spcBef>
+                        <a:spcAft>
+                          <a:spcPts val="0"/>
+                        </a:spcAft>
+                      </a:pPr>
+                      <a:r>
+                        <a:rPr lang="en-US" sz="1300" dirty="0">
+                          <a:effectLst/>
+                          <a:latin typeface="+mn-lt"/>
+                          <a:ea typeface="Arial" panose="020B0604020202020204" pitchFamily="34" charset="0"/>
+                        </a:rPr>
+                        <a:t>-4.4%</a:t>
+                      </a:r>
+                    </a:p>
+                  </a:txBody>
+                  <a:tcPr marL="79117" marR="79117" marT="0" marB="0" anchor="ctr">
+                    <a:lnL w="12700" cap="flat" cmpd="sng" algn="ctr">
+                      <a:solidFill>
+                        <a:srgbClr val="000000"/>
+                      </a:solidFill>
+                      <a:prstDash val="solid"/>
+                      <a:round/>
+                      <a:headEnd type="none" w="med" len="med"/>
+                      <a:tailEnd type="none" w="med" len="med"/>
+                    </a:lnL>
+                    <a:lnR w="12700" cap="flat" cmpd="sng" algn="ctr">
+                      <a:solidFill>
+                        <a:srgbClr val="000000"/>
+                      </a:solidFill>
+                      <a:prstDash val="solid"/>
+                      <a:round/>
+                      <a:headEnd type="none" w="med" len="med"/>
+                      <a:tailEnd type="none" w="med" len="med"/>
+                    </a:lnR>
+                    <a:lnT w="12700" cap="flat" cmpd="sng" algn="ctr">
+                      <a:solidFill>
+                        <a:srgbClr val="000000"/>
+                      </a:solidFill>
+                      <a:prstDash val="solid"/>
+                      <a:round/>
+                      <a:headEnd type="none" w="med" len="med"/>
+                      <a:tailEnd type="none" w="med" len="med"/>
+                    </a:lnT>
+                    <a:lnB w="12700" cap="flat" cmpd="sng" algn="ctr">
+                      <a:solidFill>
+                        <a:srgbClr val="000000"/>
+                      </a:solidFill>
+                      <a:prstDash val="solid"/>
+                      <a:round/>
+                      <a:headEnd type="none" w="med" len="med"/>
+                      <a:tailEnd type="none" w="med" len="med"/>
+                    </a:lnB>
+                  </a:tcPr>
+                </a:tc>
+                <a:tc>
+                  <a:txBody>
+                    <a:bodyPr/>
+                    <a:lstStyle/>
+                    <a:p>
+                      <a:pPr marL="0" marR="0" algn="ctr">
+                        <a:lnSpc>
+                          <a:spcPct val="115000"/>
+                        </a:lnSpc>
+                        <a:spcBef>
+                          <a:spcPts val="0"/>
+                        </a:spcBef>
+                        <a:spcAft>
+                          <a:spcPts val="0"/>
+                        </a:spcAft>
+                      </a:pPr>
+                      <a:r>
+                        <a:rPr lang="en-US" sz="1300" dirty="0">
+                          <a:effectLst/>
+                          <a:latin typeface="+mn-lt"/>
+                          <a:ea typeface="Arial" panose="020B0604020202020204" pitchFamily="34" charset="0"/>
+                        </a:rPr>
+                        <a:t>29,050</a:t>
+                      </a:r>
+                    </a:p>
+                  </a:txBody>
+                  <a:tcPr marL="79117" marR="79117" marT="0" marB="0" anchor="ctr">
+                    <a:lnL w="12700" cap="flat" cmpd="sng" algn="ctr">
+                      <a:solidFill>
+                        <a:srgbClr val="000000"/>
+                      </a:solidFill>
+                      <a:prstDash val="solid"/>
+                      <a:round/>
+                      <a:headEnd type="none" w="med" len="med"/>
+                      <a:tailEnd type="none" w="med" len="med"/>
+                    </a:lnL>
+                    <a:lnR w="12700" cap="flat" cmpd="sng" algn="ctr">
+                      <a:solidFill>
+                        <a:srgbClr val="000000"/>
+                      </a:solidFill>
+                      <a:prstDash val="solid"/>
+                      <a:round/>
+                      <a:headEnd type="none" w="med" len="med"/>
+                      <a:tailEnd type="none" w="med" len="med"/>
+                    </a:lnR>
+                    <a:lnT w="12700" cap="flat" cmpd="sng" algn="ctr">
+                      <a:solidFill>
+                        <a:srgbClr val="000000"/>
+                      </a:solidFill>
+                      <a:prstDash val="solid"/>
+                      <a:round/>
+                      <a:headEnd type="none" w="med" len="med"/>
+                      <a:tailEnd type="none" w="med" len="med"/>
+                    </a:lnT>
+                    <a:lnB w="12700" cap="flat" cmpd="sng" algn="ctr">
+                      <a:solidFill>
+                        <a:srgbClr val="000000"/>
+                      </a:solidFill>
+                      <a:prstDash val="solid"/>
+                      <a:round/>
+                      <a:headEnd type="none" w="med" len="med"/>
+                      <a:tailEnd type="none" w="med" len="med"/>
+                    </a:lnB>
+                  </a:tcPr>
+                </a:tc>
+                <a:extLst>
+                  <a:ext uri="{0D108BD9-81ED-4DB2-BD59-A6C34878D82A}">
+                    <a16:rowId xmlns:a16="http://schemas.microsoft.com/office/drawing/2014/main" val="930670565"/>
+                  </a:ext>
+                </a:extLst>
+              </a:tr>
+              <a:tr h="441940">
+                <a:tc>
+                  <a:txBody>
+                    <a:bodyPr/>
+                    <a:lstStyle/>
+                    <a:p>
+                      <a:pPr marL="0" marR="0">
+                        <a:lnSpc>
+                          <a:spcPct val="115000"/>
+                        </a:lnSpc>
+                        <a:spcBef>
+                          <a:spcPts val="0"/>
+                        </a:spcBef>
+                        <a:spcAft>
+                          <a:spcPts val="0"/>
+                        </a:spcAft>
+                      </a:pPr>
+                      <a:r>
+                        <a:rPr lang="en-US" sz="1300" dirty="0">
                           <a:effectLst/>
                           <a:latin typeface="Calibri" panose="020F0502020204030204" pitchFamily="34" charset="0"/>
                           <a:ea typeface="Calibri" panose="020F0502020204030204" pitchFamily="34" charset="0"/>
@@ -14372,7 +14632,7 @@
                         </a:rPr>
                         <a:t>Ridge</a:t>
                       </a:r>
-                      <a:endParaRPr lang="en-US" sz="1300">
+                      <a:endParaRPr lang="en-US" sz="1300" dirty="0">
                         <a:effectLst/>
                         <a:latin typeface="Arial" panose="020B0604020202020204" pitchFamily="34" charset="0"/>
                         <a:ea typeface="Arial" panose="020B0604020202020204" pitchFamily="34" charset="0"/>
@@ -14708,7 +14968,7 @@
                   </a:ext>
                 </a:extLst>
               </a:tr>
-              <a:tr h="543142">
+              <a:tr h="441940">
                 <a:tc>
                   <a:txBody>
                     <a:bodyPr/>
@@ -14726,7 +14986,7 @@
                         </a:spcAft>
                       </a:pPr>
                       <a:r>
-                        <a:rPr lang="en-US" sz="1300">
+                        <a:rPr lang="en-US" sz="1300" dirty="0">
                           <a:effectLst/>
                           <a:latin typeface="Calibri" panose="020F0502020204030204" pitchFamily="34" charset="0"/>
                           <a:ea typeface="Calibri" panose="020F0502020204030204" pitchFamily="34" charset="0"/>
@@ -14734,7 +14994,7 @@
                         </a:rPr>
                         <a:t>Lasso</a:t>
                       </a:r>
-                      <a:endParaRPr lang="en-US" sz="1300">
+                      <a:endParaRPr lang="en-US" sz="1300" dirty="0">
                         <a:effectLst/>
                         <a:latin typeface="Arial" panose="020B0604020202020204" pitchFamily="34" charset="0"/>
                         <a:ea typeface="Arial" panose="020B0604020202020204" pitchFamily="34" charset="0"/>
@@ -14797,7 +15057,7 @@
                         </a:spcAft>
                       </a:pPr>
                       <a:r>
-                        <a:rPr lang="en-US" sz="1300">
+                        <a:rPr lang="en-US" sz="1300" dirty="0">
                           <a:effectLst/>
                           <a:latin typeface="Calibri" panose="020F0502020204030204" pitchFamily="34" charset="0"/>
                           <a:ea typeface="Calibri" panose="020F0502020204030204" pitchFamily="34" charset="0"/>
@@ -14805,7 +15065,7 @@
                         </a:rPr>
                         <a:t>80.3%</a:t>
                       </a:r>
-                      <a:endParaRPr lang="en-US" sz="1300">
+                      <a:endParaRPr lang="en-US" sz="1300" dirty="0">
                         <a:effectLst/>
                         <a:latin typeface="Arial" panose="020B0604020202020204" pitchFamily="34" charset="0"/>
                         <a:ea typeface="Arial" panose="020B0604020202020204" pitchFamily="34" charset="0"/>
@@ -14868,7 +15128,7 @@
                         </a:spcAft>
                       </a:pPr>
                       <a:r>
-                        <a:rPr lang="en-US" sz="1300">
+                        <a:rPr lang="en-US" sz="1300" dirty="0">
                           <a:effectLst/>
                           <a:latin typeface="Calibri" panose="020F0502020204030204" pitchFamily="34" charset="0"/>
                           <a:ea typeface="Calibri" panose="020F0502020204030204" pitchFamily="34" charset="0"/>
@@ -14876,7 +15136,7 @@
                         </a:rPr>
                         <a:t>11,733</a:t>
                       </a:r>
-                      <a:endParaRPr lang="en-US" sz="1300">
+                      <a:endParaRPr lang="en-US" sz="1300" dirty="0">
                         <a:effectLst/>
                         <a:latin typeface="Arial" panose="020B0604020202020204" pitchFamily="34" charset="0"/>
                         <a:ea typeface="Arial" panose="020B0604020202020204" pitchFamily="34" charset="0"/>
@@ -15010,7 +15270,7 @@
                         </a:spcAft>
                       </a:pPr>
                       <a:r>
-                        <a:rPr lang="en-US" sz="1300">
+                        <a:rPr lang="en-US" sz="1300" dirty="0">
                           <a:effectLst/>
                           <a:latin typeface="Calibri" panose="020F0502020204030204" pitchFamily="34" charset="0"/>
                           <a:ea typeface="Calibri" panose="020F0502020204030204" pitchFamily="34" charset="0"/>
@@ -15018,7 +15278,7 @@
                         </a:rPr>
                         <a:t>13,334</a:t>
                       </a:r>
-                      <a:endParaRPr lang="en-US" sz="1300">
+                      <a:endParaRPr lang="en-US" sz="1300" dirty="0">
                         <a:effectLst/>
                         <a:latin typeface="Arial" panose="020B0604020202020204" pitchFamily="34" charset="0"/>
                         <a:ea typeface="Arial" panose="020B0604020202020204" pitchFamily="34" charset="0"/>
@@ -15070,7 +15330,7 @@
                   </a:ext>
                 </a:extLst>
               </a:tr>
-              <a:tr h="543142">
+              <a:tr h="441940">
                 <a:tc>
                   <a:txBody>
                     <a:bodyPr/>
@@ -15088,7 +15348,7 @@
                         </a:spcAft>
                       </a:pPr>
                       <a:r>
-                        <a:rPr lang="en-US" sz="1300">
+                        <a:rPr lang="en-US" sz="1300" dirty="0">
                           <a:effectLst/>
                           <a:latin typeface="Calibri" panose="020F0502020204030204" pitchFamily="34" charset="0"/>
                           <a:ea typeface="Calibri" panose="020F0502020204030204" pitchFamily="34" charset="0"/>
@@ -15096,7 +15356,7 @@
                         </a:rPr>
                         <a:t>Elastic Net</a:t>
                       </a:r>
-                      <a:endParaRPr lang="en-US" sz="1300">
+                      <a:endParaRPr lang="en-US" sz="1300" dirty="0">
                         <a:effectLst/>
                         <a:latin typeface="Arial" panose="020B0604020202020204" pitchFamily="34" charset="0"/>
                         <a:ea typeface="Arial" panose="020B0604020202020204" pitchFamily="34" charset="0"/>
@@ -15230,7 +15490,7 @@
                         </a:spcAft>
                       </a:pPr>
                       <a:r>
-                        <a:rPr lang="en-US" sz="1300">
+                        <a:rPr lang="en-US" sz="1300" dirty="0">
                           <a:effectLst/>
                           <a:latin typeface="Calibri" panose="020F0502020204030204" pitchFamily="34" charset="0"/>
                           <a:ea typeface="Calibri" panose="020F0502020204030204" pitchFamily="34" charset="0"/>
@@ -15238,7 +15498,7 @@
                         </a:rPr>
                         <a:t>11,899</a:t>
                       </a:r>
-                      <a:endParaRPr lang="en-US" sz="1300">
+                      <a:endParaRPr lang="en-US" sz="1300" dirty="0">
                         <a:effectLst/>
                         <a:latin typeface="Arial" panose="020B0604020202020204" pitchFamily="34" charset="0"/>
                         <a:ea typeface="Arial" panose="020B0604020202020204" pitchFamily="34" charset="0"/>
@@ -15432,7 +15692,7 @@
                   </a:ext>
                 </a:extLst>
               </a:tr>
-              <a:tr h="543142">
+              <a:tr h="441940">
                 <a:tc>
                   <a:txBody>
                     <a:bodyPr/>
@@ -16147,7 +16407,7 @@
                         </a:spcAft>
                       </a:pPr>
                       <a:r>
-                        <a:rPr lang="en-US" sz="1800" b="1">
+                        <a:rPr lang="en-US" sz="1800" b="1" dirty="0">
                           <a:solidFill>
                             <a:srgbClr val="FFFFFF"/>
                           </a:solidFill>
@@ -16158,7 +16418,7 @@
                         </a:rPr>
                         <a:t>ElasticNet Regression (Transformed Target) Results by Housing Type</a:t>
                       </a:r>
-                      <a:endParaRPr lang="en-US" sz="1800">
+                      <a:endParaRPr lang="en-US" sz="1800" dirty="0">
                         <a:effectLst/>
                         <a:latin typeface="Arial" panose="020B0604020202020204" pitchFamily="34" charset="0"/>
                         <a:ea typeface="Arial" panose="020B0604020202020204" pitchFamily="34" charset="0"/>
@@ -16251,7 +16511,7 @@
                         </a:spcAft>
                       </a:pPr>
                       <a:r>
-                        <a:rPr lang="en-US" sz="1800" b="1">
+                        <a:rPr lang="en-US" sz="1800" b="1" dirty="0">
                           <a:solidFill>
                             <a:srgbClr val="FFFFFF"/>
                           </a:solidFill>
@@ -16262,84 +16522,7 @@
                         </a:rPr>
                         <a:t>Housing Type</a:t>
                       </a:r>
-                      <a:endParaRPr lang="en-US" sz="1800">
-                        <a:effectLst/>
-                        <a:latin typeface="Arial" panose="020B0604020202020204" pitchFamily="34" charset="0"/>
-                        <a:ea typeface="Arial" panose="020B0604020202020204" pitchFamily="34" charset="0"/>
-                      </a:endParaRPr>
-                    </a:p>
-                  </a:txBody>
-                  <a:tcPr marL="114440" marR="114440" marT="0" marB="0">
-                    <a:lnL w="12700" cap="flat" cmpd="sng" algn="ctr">
-                      <a:solidFill>
-                        <a:srgbClr val="000000"/>
-                      </a:solidFill>
-                      <a:prstDash val="solid"/>
-                      <a:round/>
-                      <a:headEnd type="none" w="med" len="med"/>
-                      <a:tailEnd type="none" w="med" len="med"/>
-                    </a:lnL>
-                    <a:lnR w="12700" cap="flat" cmpd="sng" algn="ctr">
-                      <a:solidFill>
-                        <a:srgbClr val="000000"/>
-                      </a:solidFill>
-                      <a:prstDash val="solid"/>
-                      <a:round/>
-                      <a:headEnd type="none" w="med" len="med"/>
-                      <a:tailEnd type="none" w="med" len="med"/>
-                    </a:lnR>
-                    <a:lnT w="12700" cap="flat" cmpd="sng" algn="ctr">
-                      <a:solidFill>
-                        <a:srgbClr val="000000"/>
-                      </a:solidFill>
-                      <a:prstDash val="solid"/>
-                      <a:round/>
-                      <a:headEnd type="none" w="med" len="med"/>
-                      <a:tailEnd type="none" w="med" len="med"/>
-                    </a:lnT>
-                    <a:lnB w="12700" cap="flat" cmpd="sng" algn="ctr">
-                      <a:solidFill>
-                        <a:srgbClr val="000000"/>
-                      </a:solidFill>
-                      <a:prstDash val="solid"/>
-                      <a:round/>
-                      <a:headEnd type="none" w="med" len="med"/>
-                      <a:tailEnd type="none" w="med" len="med"/>
-                    </a:lnB>
-                    <a:solidFill>
-                      <a:schemeClr val="tx2"/>
-                    </a:solidFill>
-                  </a:tcPr>
-                </a:tc>
-                <a:tc>
-                  <a:txBody>
-                    <a:bodyPr/>
-                    <a:lstStyle/>
-                    <a:p>
-                      <a:pPr marL="0" marR="0" algn="ctr">
-                        <a:lnSpc>
-                          <a:spcPct val="115000"/>
-                        </a:lnSpc>
-                        <a:spcBef>
-                          <a:spcPts val="0"/>
-                        </a:spcBef>
-                        <a:spcAft>
-                          <a:spcPts val="0"/>
-                        </a:spcAft>
-                      </a:pPr>
-                      <a:r>
-                        <a:rPr lang="en-US" sz="1800" b="1">
-                          <a:solidFill>
-                            <a:srgbClr val="FFFFFF"/>
-                          </a:solidFill>
-                          <a:effectLst/>
-                          <a:latin typeface="Calibri" panose="020F0502020204030204" pitchFamily="34" charset="0"/>
-                          <a:ea typeface="Calibri" panose="020F0502020204030204" pitchFamily="34" charset="0"/>
-                          <a:cs typeface="Calibri" panose="020F0502020204030204" pitchFamily="34" charset="0"/>
-                        </a:rPr>
-                        <a:t>Median Consumption (kBTU)</a:t>
-                      </a:r>
-                      <a:endParaRPr lang="en-US" sz="1800">
+                      <a:endParaRPr lang="en-US" sz="1800" dirty="0">
                         <a:effectLst/>
                         <a:latin typeface="Arial" panose="020B0604020202020204" pitchFamily="34" charset="0"/>
                         <a:ea typeface="Arial" panose="020B0604020202020204" pitchFamily="34" charset="0"/>
@@ -16414,20 +16597,73 @@
                           <a:ea typeface="Calibri" panose="020F0502020204030204" pitchFamily="34" charset="0"/>
                           <a:cs typeface="Calibri" panose="020F0502020204030204" pitchFamily="34" charset="0"/>
                         </a:rPr>
-                        <a:t>MAE (</a:t>
+                        <a:t>Median Consumption (kBTU)</a:t>
                       </a:r>
-                      <a:r>
-                        <a:rPr lang="en-US" sz="1800" b="1" dirty="0" err="1">
-                          <a:solidFill>
-                            <a:srgbClr val="FFFFFF"/>
-                          </a:solidFill>
-                          <a:effectLst/>
-                          <a:latin typeface="Calibri" panose="020F0502020204030204" pitchFamily="34" charset="0"/>
-                          <a:ea typeface="Calibri" panose="020F0502020204030204" pitchFamily="34" charset="0"/>
-                          <a:cs typeface="Calibri" panose="020F0502020204030204" pitchFamily="34" charset="0"/>
-                        </a:rPr>
-                        <a:t>kBTU</a:t>
-                      </a:r>
+                      <a:endParaRPr lang="en-US" sz="1800" dirty="0">
+                        <a:effectLst/>
+                        <a:latin typeface="Arial" panose="020B0604020202020204" pitchFamily="34" charset="0"/>
+                        <a:ea typeface="Arial" panose="020B0604020202020204" pitchFamily="34" charset="0"/>
+                      </a:endParaRPr>
+                    </a:p>
+                  </a:txBody>
+                  <a:tcPr marL="114440" marR="114440" marT="0" marB="0">
+                    <a:lnL w="12700" cap="flat" cmpd="sng" algn="ctr">
+                      <a:solidFill>
+                        <a:srgbClr val="000000"/>
+                      </a:solidFill>
+                      <a:prstDash val="solid"/>
+                      <a:round/>
+                      <a:headEnd type="none" w="med" len="med"/>
+                      <a:tailEnd type="none" w="med" len="med"/>
+                    </a:lnL>
+                    <a:lnR w="12700" cap="flat" cmpd="sng" algn="ctr">
+                      <a:solidFill>
+                        <a:srgbClr val="000000"/>
+                      </a:solidFill>
+                      <a:prstDash val="solid"/>
+                      <a:round/>
+                      <a:headEnd type="none" w="med" len="med"/>
+                      <a:tailEnd type="none" w="med" len="med"/>
+                    </a:lnR>
+                    <a:lnT w="12700" cap="flat" cmpd="sng" algn="ctr">
+                      <a:solidFill>
+                        <a:srgbClr val="000000"/>
+                      </a:solidFill>
+                      <a:prstDash val="solid"/>
+                      <a:round/>
+                      <a:headEnd type="none" w="med" len="med"/>
+                      <a:tailEnd type="none" w="med" len="med"/>
+                    </a:lnT>
+                    <a:lnB w="12700" cap="flat" cmpd="sng" algn="ctr">
+                      <a:solidFill>
+                        <a:srgbClr val="000000"/>
+                      </a:solidFill>
+                      <a:prstDash val="solid"/>
+                      <a:round/>
+                      <a:headEnd type="none" w="med" len="med"/>
+                      <a:tailEnd type="none" w="med" len="med"/>
+                    </a:lnB>
+                    <a:solidFill>
+                      <a:schemeClr val="tx2"/>
+                    </a:solidFill>
+                  </a:tcPr>
+                </a:tc>
+                <a:tc>
+                  <a:txBody>
+                    <a:bodyPr/>
+                    <a:lstStyle/>
+                    <a:p>
+                      <a:pPr marL="0" marR="0" algn="ctr">
+                        <a:lnSpc>
+                          <a:spcPct val="115000"/>
+                        </a:lnSpc>
+                        <a:spcBef>
+                          <a:spcPts val="0"/>
+                        </a:spcBef>
+                        <a:spcAft>
+                          <a:spcPts val="0"/>
+                        </a:spcAft>
+                      </a:pPr>
                       <a:r>
                         <a:rPr lang="en-US" sz="1800" b="1" dirty="0">
                           <a:solidFill>
@@ -16438,7 +16674,7 @@
                           <a:ea typeface="Calibri" panose="020F0502020204030204" pitchFamily="34" charset="0"/>
                           <a:cs typeface="Calibri" panose="020F0502020204030204" pitchFamily="34" charset="0"/>
                         </a:rPr>
-                        <a:t>)</a:t>
+                        <a:t>MAE (kBTU)</a:t>
                       </a:r>
                       <a:endParaRPr lang="en-US" sz="1800" dirty="0">
                         <a:effectLst/>
@@ -16513,7 +16749,7 @@
                         </a:spcAft>
                       </a:pPr>
                       <a:r>
-                        <a:rPr lang="en-US" sz="1800">
+                        <a:rPr lang="en-US" sz="1800" dirty="0">
                           <a:effectLst/>
                           <a:latin typeface="Calibri" panose="020F0502020204030204" pitchFamily="34" charset="0"/>
                           <a:ea typeface="Calibri" panose="020F0502020204030204" pitchFamily="34" charset="0"/>
@@ -16521,7 +16757,7 @@
                         </a:rPr>
                         <a:t>Mobile Home</a:t>
                       </a:r>
-                      <a:endParaRPr lang="en-US" sz="1800">
+                      <a:endParaRPr lang="en-US" sz="1800" dirty="0">
                         <a:effectLst/>
                         <a:latin typeface="Arial" panose="020B0604020202020204" pitchFamily="34" charset="0"/>
                         <a:ea typeface="Arial" panose="020B0604020202020204" pitchFamily="34" charset="0"/>
@@ -16584,7 +16820,7 @@
                         </a:spcAft>
                       </a:pPr>
                       <a:r>
-                        <a:rPr lang="en-US" sz="1800">
+                        <a:rPr lang="en-US" sz="1800" dirty="0">
                           <a:effectLst/>
                           <a:latin typeface="Calibri" panose="020F0502020204030204" pitchFamily="34" charset="0"/>
                           <a:ea typeface="Calibri" panose="020F0502020204030204" pitchFamily="34" charset="0"/>
@@ -16592,7 +16828,7 @@
                         </a:rPr>
                         <a:t>57,398</a:t>
                       </a:r>
-                      <a:endParaRPr lang="en-US" sz="1800">
+                      <a:endParaRPr lang="en-US" sz="1800" dirty="0">
                         <a:effectLst/>
                         <a:latin typeface="Arial" panose="020B0604020202020204" pitchFamily="34" charset="0"/>
                         <a:ea typeface="Arial" panose="020B0604020202020204" pitchFamily="34" charset="0"/>
@@ -16655,7 +16891,7 @@
                         </a:spcAft>
                       </a:pPr>
                       <a:r>
-                        <a:rPr lang="en-US" sz="1800">
+                        <a:rPr lang="en-US" sz="1800" dirty="0">
                           <a:effectLst/>
                           <a:latin typeface="Calibri" panose="020F0502020204030204" pitchFamily="34" charset="0"/>
                           <a:ea typeface="Calibri" panose="020F0502020204030204" pitchFamily="34" charset="0"/>
@@ -16663,7 +16899,7 @@
                         </a:rPr>
                         <a:t>11,291</a:t>
                       </a:r>
-                      <a:endParaRPr lang="en-US" sz="1800">
+                      <a:endParaRPr lang="en-US" sz="1800" dirty="0">
                         <a:effectLst/>
                         <a:latin typeface="Arial" panose="020B0604020202020204" pitchFamily="34" charset="0"/>
                         <a:ea typeface="Arial" panose="020B0604020202020204" pitchFamily="34" charset="0"/>
@@ -16733,7 +16969,7 @@
                         </a:spcAft>
                       </a:pPr>
                       <a:r>
-                        <a:rPr lang="en-US" sz="1800">
+                        <a:rPr lang="en-US" sz="1800" dirty="0">
                           <a:effectLst/>
                           <a:latin typeface="Calibri" panose="020F0502020204030204" pitchFamily="34" charset="0"/>
                           <a:ea typeface="Calibri" panose="020F0502020204030204" pitchFamily="34" charset="0"/>
@@ -16741,7 +16977,7 @@
                         </a:rPr>
                         <a:t>Single Family Detached </a:t>
                       </a:r>
-                      <a:endParaRPr lang="en-US" sz="1800">
+                      <a:endParaRPr lang="en-US" sz="1800" dirty="0">
                         <a:effectLst/>
                         <a:latin typeface="Arial" panose="020B0604020202020204" pitchFamily="34" charset="0"/>
                         <a:ea typeface="Arial" panose="020B0604020202020204" pitchFamily="34" charset="0"/>
@@ -16804,7 +17040,7 @@
                         </a:spcAft>
                       </a:pPr>
                       <a:r>
-                        <a:rPr lang="en-US" sz="1800">
+                        <a:rPr lang="en-US" sz="1800" dirty="0">
                           <a:effectLst/>
                           <a:latin typeface="Calibri" panose="020F0502020204030204" pitchFamily="34" charset="0"/>
                           <a:ea typeface="Calibri" panose="020F0502020204030204" pitchFamily="34" charset="0"/>
@@ -16812,7 +17048,7 @@
                         </a:rPr>
                         <a:t>85,531</a:t>
                       </a:r>
-                      <a:endParaRPr lang="en-US" sz="1800">
+                      <a:endParaRPr lang="en-US" sz="1800" dirty="0">
                         <a:effectLst/>
                         <a:latin typeface="Arial" panose="020B0604020202020204" pitchFamily="34" charset="0"/>
                         <a:ea typeface="Arial" panose="020B0604020202020204" pitchFamily="34" charset="0"/>
@@ -16875,7 +17111,7 @@
                         </a:spcAft>
                       </a:pPr>
                       <a:r>
-                        <a:rPr lang="en-US" sz="1800">
+                        <a:rPr lang="en-US" sz="1800" dirty="0">
                           <a:effectLst/>
                           <a:latin typeface="Calibri" panose="020F0502020204030204" pitchFamily="34" charset="0"/>
                           <a:ea typeface="Calibri" panose="020F0502020204030204" pitchFamily="34" charset="0"/>
@@ -16883,7 +17119,7 @@
                         </a:rPr>
                         <a:t>13,011</a:t>
                       </a:r>
-                      <a:endParaRPr lang="en-US" sz="1800">
+                      <a:endParaRPr lang="en-US" sz="1800" dirty="0">
                         <a:effectLst/>
                         <a:latin typeface="Arial" panose="020B0604020202020204" pitchFamily="34" charset="0"/>
                         <a:ea typeface="Arial" panose="020B0604020202020204" pitchFamily="34" charset="0"/>
@@ -16953,7 +17189,7 @@
                         </a:spcAft>
                       </a:pPr>
                       <a:r>
-                        <a:rPr lang="en-US" sz="1800">
+                        <a:rPr lang="en-US" sz="1800" dirty="0">
                           <a:effectLst/>
                           <a:latin typeface="Calibri" panose="020F0502020204030204" pitchFamily="34" charset="0"/>
                           <a:ea typeface="Calibri" panose="020F0502020204030204" pitchFamily="34" charset="0"/>
@@ -16961,7 +17197,7 @@
                         </a:rPr>
                         <a:t>Single Family Attached</a:t>
                       </a:r>
-                      <a:endParaRPr lang="en-US" sz="1800">
+                      <a:endParaRPr lang="en-US" sz="1800" dirty="0">
                         <a:effectLst/>
                         <a:latin typeface="Arial" panose="020B0604020202020204" pitchFamily="34" charset="0"/>
                         <a:ea typeface="Arial" panose="020B0604020202020204" pitchFamily="34" charset="0"/>
@@ -17024,7 +17260,7 @@
                         </a:spcAft>
                       </a:pPr>
                       <a:r>
-                        <a:rPr lang="en-US" sz="1800">
+                        <a:rPr lang="en-US" sz="1800" dirty="0">
                           <a:effectLst/>
                           <a:latin typeface="Calibri" panose="020F0502020204030204" pitchFamily="34" charset="0"/>
                           <a:ea typeface="Calibri" panose="020F0502020204030204" pitchFamily="34" charset="0"/>
@@ -17032,7 +17268,7 @@
                         </a:rPr>
                         <a:t>55,208</a:t>
                       </a:r>
-                      <a:endParaRPr lang="en-US" sz="1800">
+                      <a:endParaRPr lang="en-US" sz="1800" dirty="0">
                         <a:effectLst/>
                         <a:latin typeface="Arial" panose="020B0604020202020204" pitchFamily="34" charset="0"/>
                         <a:ea typeface="Arial" panose="020B0604020202020204" pitchFamily="34" charset="0"/>
@@ -17095,7 +17331,7 @@
                         </a:spcAft>
                       </a:pPr>
                       <a:r>
-                        <a:rPr lang="en-US" sz="1800">
+                        <a:rPr lang="en-US" sz="1800" dirty="0">
                           <a:effectLst/>
                           <a:latin typeface="Calibri" panose="020F0502020204030204" pitchFamily="34" charset="0"/>
                           <a:ea typeface="Calibri" panose="020F0502020204030204" pitchFamily="34" charset="0"/>
@@ -17103,7 +17339,7 @@
                         </a:rPr>
                         <a:t>10,315</a:t>
                       </a:r>
-                      <a:endParaRPr lang="en-US" sz="1800">
+                      <a:endParaRPr lang="en-US" sz="1800" dirty="0">
                         <a:effectLst/>
                         <a:latin typeface="Arial" panose="020B0604020202020204" pitchFamily="34" charset="0"/>
                         <a:ea typeface="Arial" panose="020B0604020202020204" pitchFamily="34" charset="0"/>
@@ -17173,7 +17409,7 @@
                         </a:spcAft>
                       </a:pPr>
                       <a:r>
-                        <a:rPr lang="en-US" sz="1800">
+                        <a:rPr lang="en-US" sz="1800" dirty="0">
                           <a:effectLst/>
                           <a:latin typeface="Calibri" panose="020F0502020204030204" pitchFamily="34" charset="0"/>
                           <a:ea typeface="Calibri" panose="020F0502020204030204" pitchFamily="34" charset="0"/>
@@ -17181,7 +17417,7 @@
                         </a:rPr>
                         <a:t>Apartment Building w/ 2-4 units</a:t>
                       </a:r>
-                      <a:endParaRPr lang="en-US" sz="1800">
+                      <a:endParaRPr lang="en-US" sz="1800" dirty="0">
                         <a:effectLst/>
                         <a:latin typeface="Arial" panose="020B0604020202020204" pitchFamily="34" charset="0"/>
                         <a:ea typeface="Arial" panose="020B0604020202020204" pitchFamily="34" charset="0"/>
@@ -17244,7 +17480,7 @@
                         </a:spcAft>
                       </a:pPr>
                       <a:r>
-                        <a:rPr lang="en-US" sz="1800">
+                        <a:rPr lang="en-US" sz="1800" dirty="0">
                           <a:effectLst/>
                           <a:latin typeface="Calibri" panose="020F0502020204030204" pitchFamily="34" charset="0"/>
                           <a:ea typeface="Calibri" panose="020F0502020204030204" pitchFamily="34" charset="0"/>
@@ -17252,7 +17488,7 @@
                         </a:rPr>
                         <a:t>42,284</a:t>
                       </a:r>
-                      <a:endParaRPr lang="en-US" sz="1800">
+                      <a:endParaRPr lang="en-US" sz="1800" dirty="0">
                         <a:effectLst/>
                         <a:latin typeface="Arial" panose="020B0604020202020204" pitchFamily="34" charset="0"/>
                         <a:ea typeface="Arial" panose="020B0604020202020204" pitchFamily="34" charset="0"/>
@@ -17315,7 +17551,7 @@
                         </a:spcAft>
                       </a:pPr>
                       <a:r>
-                        <a:rPr lang="en-US" sz="1800">
+                        <a:rPr lang="en-US" sz="1800" dirty="0">
                           <a:effectLst/>
                           <a:latin typeface="Calibri" panose="020F0502020204030204" pitchFamily="34" charset="0"/>
                           <a:ea typeface="Calibri" panose="020F0502020204030204" pitchFamily="34" charset="0"/>
@@ -17323,7 +17559,7 @@
                         </a:rPr>
                         <a:t>7,891</a:t>
                       </a:r>
-                      <a:endParaRPr lang="en-US" sz="1800">
+                      <a:endParaRPr lang="en-US" sz="1800" dirty="0">
                         <a:effectLst/>
                         <a:latin typeface="Arial" panose="020B0604020202020204" pitchFamily="34" charset="0"/>
                         <a:ea typeface="Arial" panose="020B0604020202020204" pitchFamily="34" charset="0"/>
@@ -17393,7 +17629,7 @@
                         </a:spcAft>
                       </a:pPr>
                       <a:r>
-                        <a:rPr lang="en-US" sz="1800">
+                        <a:rPr lang="en-US" sz="1800" dirty="0">
                           <a:effectLst/>
                           <a:latin typeface="Calibri" panose="020F0502020204030204" pitchFamily="34" charset="0"/>
                           <a:ea typeface="Calibri" panose="020F0502020204030204" pitchFamily="34" charset="0"/>
@@ -17401,7 +17637,7 @@
                         </a:rPr>
                         <a:t>Apartment Building w/ 5+ Units</a:t>
                       </a:r>
-                      <a:endParaRPr lang="en-US" sz="1800">
+                      <a:endParaRPr lang="en-US" sz="1800" dirty="0">
                         <a:effectLst/>
                         <a:latin typeface="Arial" panose="020B0604020202020204" pitchFamily="34" charset="0"/>
                         <a:ea typeface="Arial" panose="020B0604020202020204" pitchFamily="34" charset="0"/>
@@ -17464,7 +17700,7 @@
                         </a:spcAft>
                       </a:pPr>
                       <a:r>
-                        <a:rPr lang="en-US" sz="1800">
+                        <a:rPr lang="en-US" sz="1800" dirty="0">
                           <a:effectLst/>
                           <a:latin typeface="Calibri" panose="020F0502020204030204" pitchFamily="34" charset="0"/>
                           <a:ea typeface="Calibri" panose="020F0502020204030204" pitchFamily="34" charset="0"/>
@@ -17472,7 +17708,7 @@
                         </a:rPr>
                         <a:t>30,291</a:t>
                       </a:r>
-                      <a:endParaRPr lang="en-US" sz="1800">
+                      <a:endParaRPr lang="en-US" sz="1800" dirty="0">
                         <a:effectLst/>
                         <a:latin typeface="Arial" panose="020B0604020202020204" pitchFamily="34" charset="0"/>
                         <a:ea typeface="Arial" panose="020B0604020202020204" pitchFamily="34" charset="0"/>
@@ -17704,7 +17940,7 @@
             </a:pPr>
             <a:r>
               <a:rPr lang="en-US" sz="2000" dirty="0"/>
-              <a:t>One of benefits of the type of model chosen is the ability to analyze the variables that are influence predictions to gain insight into what the most important factors are in addition to the ability to use these results to verify/improve the model in the future. The model found the </a:t>
+              <a:t>One of benefits of the type of model chosen is the ability to analyze the variables that are influence predictions to gain insight into what the most important factors are in addition to the ability to use these results to verify/improve the model in the future. The model found the following features to be most important:</a:t>
             </a:r>
             <a:endParaRPr lang="en-US" sz="1600" dirty="0"/>
           </a:p>
@@ -17982,7 +18218,7 @@
                         </a:spcAft>
                       </a:pPr>
                       <a:r>
-                        <a:rPr lang="en-US" sz="1100" b="1">
+                        <a:rPr lang="en-US" sz="1100" b="1" dirty="0">
                           <a:solidFill>
                             <a:srgbClr val="FFFFFF"/>
                           </a:solidFill>
@@ -17993,7 +18229,7 @@
                         </a:rPr>
                         <a:t>Rank</a:t>
                       </a:r>
-                      <a:endParaRPr lang="en-US" sz="1100">
+                      <a:endParaRPr lang="en-US" sz="1100" dirty="0">
                         <a:effectLst/>
                         <a:latin typeface="Arial" panose="020B0604020202020204" pitchFamily="34" charset="0"/>
                         <a:ea typeface="Arial" panose="020B0604020202020204" pitchFamily="34" charset="0"/>
@@ -18143,7 +18379,7 @@
                         </a:spcAft>
                       </a:pPr>
                       <a:r>
-                        <a:rPr lang="en-US" sz="1100">
+                        <a:rPr lang="en-US" sz="1100" dirty="0">
                           <a:effectLst/>
                           <a:latin typeface="Calibri" panose="020F0502020204030204" pitchFamily="34" charset="0"/>
                           <a:ea typeface="Calibri" panose="020F0502020204030204" pitchFamily="34" charset="0"/>
@@ -18151,7 +18387,7 @@
                         </a:rPr>
                         <a:t>1</a:t>
                       </a:r>
-                      <a:endParaRPr lang="en-US" sz="1100">
+                      <a:endParaRPr lang="en-US" sz="1100" dirty="0">
                         <a:effectLst/>
                         <a:latin typeface="Arial" panose="020B0604020202020204" pitchFamily="34" charset="0"/>
                         <a:ea typeface="Arial" panose="020B0604020202020204" pitchFamily="34" charset="0"/>
@@ -18214,7 +18450,7 @@
                         </a:spcAft>
                       </a:pPr>
                       <a:r>
-                        <a:rPr lang="en-US" sz="1100">
+                        <a:rPr lang="en-US" sz="1100" dirty="0">
                           <a:effectLst/>
                           <a:latin typeface="Calibri" panose="020F0502020204030204" pitchFamily="34" charset="0"/>
                           <a:ea typeface="Calibri" panose="020F0502020204030204" pitchFamily="34" charset="0"/>
@@ -18222,7 +18458,7 @@
                         </a:rPr>
                         <a:t>Use of wood for space heating</a:t>
                       </a:r>
-                      <a:endParaRPr lang="en-US" sz="1100">
+                      <a:endParaRPr lang="en-US" sz="1100" dirty="0">
                         <a:effectLst/>
                         <a:latin typeface="Arial" panose="020B0604020202020204" pitchFamily="34" charset="0"/>
                         <a:ea typeface="Arial" panose="020B0604020202020204" pitchFamily="34" charset="0"/>
@@ -18292,7 +18528,7 @@
                         </a:spcAft>
                       </a:pPr>
                       <a:r>
-                        <a:rPr lang="en-US" sz="1100">
+                        <a:rPr lang="en-US" sz="1100" dirty="0">
                           <a:effectLst/>
                           <a:latin typeface="Calibri" panose="020F0502020204030204" pitchFamily="34" charset="0"/>
                           <a:ea typeface="Calibri" panose="020F0502020204030204" pitchFamily="34" charset="0"/>
@@ -18300,7 +18536,7 @@
                         </a:rPr>
                         <a:t>2</a:t>
                       </a:r>
-                      <a:endParaRPr lang="en-US" sz="1100">
+                      <a:endParaRPr lang="en-US" sz="1100" dirty="0">
                         <a:effectLst/>
                         <a:latin typeface="Arial" panose="020B0604020202020204" pitchFamily="34" charset="0"/>
                         <a:ea typeface="Arial" panose="020B0604020202020204" pitchFamily="34" charset="0"/>
@@ -18363,7 +18599,7 @@
                         </a:spcAft>
                       </a:pPr>
                       <a:r>
-                        <a:rPr lang="en-US" sz="1100">
+                        <a:rPr lang="en-US" sz="1100" dirty="0">
                           <a:effectLst/>
                           <a:latin typeface="Calibri" panose="020F0502020204030204" pitchFamily="34" charset="0"/>
                           <a:ea typeface="Calibri" panose="020F0502020204030204" pitchFamily="34" charset="0"/>
@@ -18371,7 +18607,7 @@
                         </a:rPr>
                         <a:t>Use of other fuel type* for space heating</a:t>
                       </a:r>
-                      <a:endParaRPr lang="en-US" sz="1100">
+                      <a:endParaRPr lang="en-US" sz="1100" dirty="0">
                         <a:effectLst/>
                         <a:latin typeface="Arial" panose="020B0604020202020204" pitchFamily="34" charset="0"/>
                         <a:ea typeface="Arial" panose="020B0604020202020204" pitchFamily="34" charset="0"/>
@@ -18441,7 +18677,7 @@
                         </a:spcAft>
                       </a:pPr>
                       <a:r>
-                        <a:rPr lang="en-US" sz="1100">
+                        <a:rPr lang="en-US" sz="1100" dirty="0">
                           <a:effectLst/>
                           <a:latin typeface="Calibri" panose="020F0502020204030204" pitchFamily="34" charset="0"/>
                           <a:ea typeface="Calibri" panose="020F0502020204030204" pitchFamily="34" charset="0"/>
@@ -18449,7 +18685,7 @@
                         </a:rPr>
                         <a:t>3</a:t>
                       </a:r>
-                      <a:endParaRPr lang="en-US" sz="1100">
+                      <a:endParaRPr lang="en-US" sz="1100" dirty="0">
                         <a:effectLst/>
                         <a:latin typeface="Arial" panose="020B0604020202020204" pitchFamily="34" charset="0"/>
                         <a:ea typeface="Arial" panose="020B0604020202020204" pitchFamily="34" charset="0"/>
@@ -18512,7 +18748,7 @@
                         </a:spcAft>
                       </a:pPr>
                       <a:r>
-                        <a:rPr lang="en-US" sz="1100">
+                        <a:rPr lang="en-US" sz="1100" dirty="0">
                           <a:effectLst/>
                           <a:latin typeface="Calibri" panose="020F0502020204030204" pitchFamily="34" charset="0"/>
                           <a:ea typeface="Calibri" panose="020F0502020204030204" pitchFamily="34" charset="0"/>
@@ -18520,7 +18756,7 @@
                         </a:rPr>
                         <a:t>Indicator for Apartment Building w/ 5+ Units</a:t>
                       </a:r>
-                      <a:endParaRPr lang="en-US" sz="1100">
+                      <a:endParaRPr lang="en-US" sz="1100" dirty="0">
                         <a:effectLst/>
                         <a:latin typeface="Arial" panose="020B0604020202020204" pitchFamily="34" charset="0"/>
                         <a:ea typeface="Arial" panose="020B0604020202020204" pitchFamily="34" charset="0"/>
@@ -18590,7 +18826,7 @@
                         </a:spcAft>
                       </a:pPr>
                       <a:r>
-                        <a:rPr lang="en-US" sz="1100">
+                        <a:rPr lang="en-US" sz="1100" dirty="0">
                           <a:effectLst/>
                           <a:latin typeface="Calibri" panose="020F0502020204030204" pitchFamily="34" charset="0"/>
                           <a:ea typeface="Calibri" panose="020F0502020204030204" pitchFamily="34" charset="0"/>
@@ -18598,7 +18834,7 @@
                         </a:rPr>
                         <a:t>4</a:t>
                       </a:r>
-                      <a:endParaRPr lang="en-US" sz="1100">
+                      <a:endParaRPr lang="en-US" sz="1100" dirty="0">
                         <a:effectLst/>
                         <a:latin typeface="Arial" panose="020B0604020202020204" pitchFamily="34" charset="0"/>
                         <a:ea typeface="Arial" panose="020B0604020202020204" pitchFamily="34" charset="0"/>
@@ -18661,7 +18897,7 @@
                         </a:spcAft>
                       </a:pPr>
                       <a:r>
-                        <a:rPr lang="en-US" sz="1100">
+                        <a:rPr lang="en-US" sz="1100" dirty="0">
                           <a:effectLst/>
                           <a:latin typeface="Calibri" panose="020F0502020204030204" pitchFamily="34" charset="0"/>
                           <a:ea typeface="Calibri" panose="020F0502020204030204" pitchFamily="34" charset="0"/>
@@ -18669,7 +18905,7 @@
                         </a:rPr>
                         <a:t>Use of propane for space heating</a:t>
                       </a:r>
-                      <a:endParaRPr lang="en-US" sz="1100">
+                      <a:endParaRPr lang="en-US" sz="1100" dirty="0">
                         <a:effectLst/>
                         <a:latin typeface="Arial" panose="020B0604020202020204" pitchFamily="34" charset="0"/>
                         <a:ea typeface="Arial" panose="020B0604020202020204" pitchFamily="34" charset="0"/>
@@ -18739,7 +18975,7 @@
                         </a:spcAft>
                       </a:pPr>
                       <a:r>
-                        <a:rPr lang="en-US" sz="1100">
+                        <a:rPr lang="en-US" sz="1100" dirty="0">
                           <a:effectLst/>
                           <a:latin typeface="Calibri" panose="020F0502020204030204" pitchFamily="34" charset="0"/>
                           <a:ea typeface="Calibri" panose="020F0502020204030204" pitchFamily="34" charset="0"/>
@@ -18747,7 +18983,7 @@
                         </a:rPr>
                         <a:t>5</a:t>
                       </a:r>
-                      <a:endParaRPr lang="en-US" sz="1100">
+                      <a:endParaRPr lang="en-US" sz="1100" dirty="0">
                         <a:effectLst/>
                         <a:latin typeface="Arial" panose="020B0604020202020204" pitchFamily="34" charset="0"/>
                         <a:ea typeface="Arial" panose="020B0604020202020204" pitchFamily="34" charset="0"/>
@@ -18810,7 +19046,7 @@
                         </a:spcAft>
                       </a:pPr>
                       <a:r>
-                        <a:rPr lang="en-US" sz="1100">
+                        <a:rPr lang="en-US" sz="1100" dirty="0">
                           <a:effectLst/>
                           <a:latin typeface="Calibri" panose="020F0502020204030204" pitchFamily="34" charset="0"/>
                           <a:ea typeface="Calibri" panose="020F0502020204030204" pitchFamily="34" charset="0"/>
@@ -18818,7 +19054,7 @@
                         </a:rPr>
                         <a:t>Categorical Indicator for studio apartment (Yes)</a:t>
                       </a:r>
-                      <a:endParaRPr lang="en-US" sz="1100">
+                      <a:endParaRPr lang="en-US" sz="1100" dirty="0">
                         <a:effectLst/>
                         <a:latin typeface="Arial" panose="020B0604020202020204" pitchFamily="34" charset="0"/>
                         <a:ea typeface="Arial" panose="020B0604020202020204" pitchFamily="34" charset="0"/>
@@ -18888,7 +19124,7 @@
                         </a:spcAft>
                       </a:pPr>
                       <a:r>
-                        <a:rPr lang="en-US" sz="1100">
+                        <a:rPr lang="en-US" sz="1100" dirty="0">
                           <a:effectLst/>
                           <a:latin typeface="Calibri" panose="020F0502020204030204" pitchFamily="34" charset="0"/>
                           <a:ea typeface="Calibri" panose="020F0502020204030204" pitchFamily="34" charset="0"/>
@@ -18896,7 +19132,7 @@
                         </a:rPr>
                         <a:t>6</a:t>
                       </a:r>
-                      <a:endParaRPr lang="en-US" sz="1100">
+                      <a:endParaRPr lang="en-US" sz="1100" dirty="0">
                         <a:effectLst/>
                         <a:latin typeface="Arial" panose="020B0604020202020204" pitchFamily="34" charset="0"/>
                         <a:ea typeface="Arial" panose="020B0604020202020204" pitchFamily="34" charset="0"/>
@@ -18959,7 +19195,7 @@
                         </a:spcAft>
                       </a:pPr>
                       <a:r>
-                        <a:rPr lang="en-US" sz="1100">
+                        <a:rPr lang="en-US" sz="1100" dirty="0">
                           <a:effectLst/>
                           <a:latin typeface="Calibri" panose="020F0502020204030204" pitchFamily="34" charset="0"/>
                           <a:ea typeface="Calibri" panose="020F0502020204030204" pitchFamily="34" charset="0"/>
@@ -18967,7 +19203,7 @@
                         </a:rPr>
                         <a:t>Indicator for household built between 2010 -2015</a:t>
                       </a:r>
-                      <a:endParaRPr lang="en-US" sz="1100">
+                      <a:endParaRPr lang="en-US" sz="1100" dirty="0">
                         <a:effectLst/>
                         <a:latin typeface="Arial" panose="020B0604020202020204" pitchFamily="34" charset="0"/>
                         <a:ea typeface="Arial" panose="020B0604020202020204" pitchFamily="34" charset="0"/>
@@ -19037,7 +19273,7 @@
                         </a:spcAft>
                       </a:pPr>
                       <a:r>
-                        <a:rPr lang="en-US" sz="1100">
+                        <a:rPr lang="en-US" sz="1100" dirty="0">
                           <a:effectLst/>
                           <a:latin typeface="Calibri" panose="020F0502020204030204" pitchFamily="34" charset="0"/>
                           <a:ea typeface="Calibri" panose="020F0502020204030204" pitchFamily="34" charset="0"/>
@@ -19045,7 +19281,7 @@
                         </a:rPr>
                         <a:t>7</a:t>
                       </a:r>
-                      <a:endParaRPr lang="en-US" sz="1100">
+                      <a:endParaRPr lang="en-US" sz="1100" dirty="0">
                         <a:effectLst/>
                         <a:latin typeface="Arial" panose="020B0604020202020204" pitchFamily="34" charset="0"/>
                         <a:ea typeface="Arial" panose="020B0604020202020204" pitchFamily="34" charset="0"/>
@@ -19108,7 +19344,7 @@
                         </a:spcAft>
                       </a:pPr>
                       <a:r>
-                        <a:rPr lang="en-US" sz="1100">
+                        <a:rPr lang="en-US" sz="1100" dirty="0">
                           <a:effectLst/>
                           <a:latin typeface="Calibri" panose="020F0502020204030204" pitchFamily="34" charset="0"/>
                           <a:ea typeface="Calibri" panose="020F0502020204030204" pitchFamily="34" charset="0"/>
@@ -19116,7 +19352,7 @@
                         </a:rPr>
                         <a:t>Indicator for electricity used for water heating</a:t>
                       </a:r>
-                      <a:endParaRPr lang="en-US" sz="1100">
+                      <a:endParaRPr lang="en-US" sz="1100" dirty="0">
                         <a:effectLst/>
                         <a:latin typeface="Arial" panose="020B0604020202020204" pitchFamily="34" charset="0"/>
                         <a:ea typeface="Arial" panose="020B0604020202020204" pitchFamily="34" charset="0"/>
@@ -19186,7 +19422,7 @@
                         </a:spcAft>
                       </a:pPr>
                       <a:r>
-                        <a:rPr lang="en-US" sz="1100">
+                        <a:rPr lang="en-US" sz="1100" dirty="0">
                           <a:effectLst/>
                           <a:latin typeface="Calibri" panose="020F0502020204030204" pitchFamily="34" charset="0"/>
                           <a:ea typeface="Calibri" panose="020F0502020204030204" pitchFamily="34" charset="0"/>
@@ -19194,7 +19430,7 @@
                         </a:rPr>
                         <a:t>8</a:t>
                       </a:r>
-                      <a:endParaRPr lang="en-US" sz="1100">
+                      <a:endParaRPr lang="en-US" sz="1100" dirty="0">
                         <a:effectLst/>
                         <a:latin typeface="Arial" panose="020B0604020202020204" pitchFamily="34" charset="0"/>
                         <a:ea typeface="Arial" panose="020B0604020202020204" pitchFamily="34" charset="0"/>
@@ -19257,7 +19493,7 @@
                         </a:spcAft>
                       </a:pPr>
                       <a:r>
-                        <a:rPr lang="en-US" sz="1100">
+                        <a:rPr lang="en-US" sz="1100" dirty="0">
                           <a:effectLst/>
                           <a:latin typeface="Calibri" panose="020F0502020204030204" pitchFamily="34" charset="0"/>
                           <a:ea typeface="Calibri" panose="020F0502020204030204" pitchFamily="34" charset="0"/>
@@ -19265,7 +19501,7 @@
                         </a:rPr>
                         <a:t>Indicator for water heater in apartment</a:t>
                       </a:r>
-                      <a:endParaRPr lang="en-US" sz="1100">
+                      <a:endParaRPr lang="en-US" sz="1100" dirty="0">
                         <a:effectLst/>
                         <a:latin typeface="Arial" panose="020B0604020202020204" pitchFamily="34" charset="0"/>
                         <a:ea typeface="Arial" panose="020B0604020202020204" pitchFamily="34" charset="0"/>
@@ -19335,7 +19571,7 @@
                         </a:spcAft>
                       </a:pPr>
                       <a:r>
-                        <a:rPr lang="en-US" sz="1100">
+                        <a:rPr lang="en-US" sz="1100" dirty="0">
                           <a:effectLst/>
                           <a:latin typeface="Calibri" panose="020F0502020204030204" pitchFamily="34" charset="0"/>
                           <a:ea typeface="Calibri" panose="020F0502020204030204" pitchFamily="34" charset="0"/>
@@ -19343,7 +19579,7 @@
                         </a:rPr>
                         <a:t>9</a:t>
                       </a:r>
-                      <a:endParaRPr lang="en-US" sz="1100">
+                      <a:endParaRPr lang="en-US" sz="1100" dirty="0">
                         <a:effectLst/>
                         <a:latin typeface="Arial" panose="020B0604020202020204" pitchFamily="34" charset="0"/>
                         <a:ea typeface="Arial" panose="020B0604020202020204" pitchFamily="34" charset="0"/>
@@ -19406,7 +19642,7 @@
                         </a:spcAft>
                       </a:pPr>
                       <a:r>
-                        <a:rPr lang="en-US" sz="1100">
+                        <a:rPr lang="en-US" sz="1100" dirty="0">
                           <a:effectLst/>
                           <a:latin typeface="Calibri" panose="020F0502020204030204" pitchFamily="34" charset="0"/>
                           <a:ea typeface="Calibri" panose="020F0502020204030204" pitchFamily="34" charset="0"/>
@@ -19414,7 +19650,7 @@
                         </a:rPr>
                         <a:t>Indicator for receiving assistance for energy bills</a:t>
                       </a:r>
-                      <a:endParaRPr lang="en-US" sz="1100">
+                      <a:endParaRPr lang="en-US" sz="1100" dirty="0">
                         <a:effectLst/>
                         <a:latin typeface="Arial" panose="020B0604020202020204" pitchFamily="34" charset="0"/>
                         <a:ea typeface="Arial" panose="020B0604020202020204" pitchFamily="34" charset="0"/>
@@ -19484,7 +19720,7 @@
                         </a:spcAft>
                       </a:pPr>
                       <a:r>
-                        <a:rPr lang="en-US" sz="1100">
+                        <a:rPr lang="en-US" sz="1100" dirty="0">
                           <a:effectLst/>
                           <a:latin typeface="Calibri" panose="020F0502020204030204" pitchFamily="34" charset="0"/>
                           <a:ea typeface="Calibri" panose="020F0502020204030204" pitchFamily="34" charset="0"/>
@@ -19492,7 +19728,7 @@
                         </a:rPr>
                         <a:t>10</a:t>
                       </a:r>
-                      <a:endParaRPr lang="en-US" sz="1100">
+                      <a:endParaRPr lang="en-US" sz="1100" dirty="0">
                         <a:effectLst/>
                         <a:latin typeface="Arial" panose="020B0604020202020204" pitchFamily="34" charset="0"/>
                         <a:ea typeface="Arial" panose="020B0604020202020204" pitchFamily="34" charset="0"/>
@@ -19633,7 +19869,7 @@
                         </a:spcAft>
                       </a:pPr>
                       <a:r>
-                        <a:rPr lang="en-US" sz="1100">
+                        <a:rPr lang="en-US" sz="1100" dirty="0">
                           <a:effectLst/>
                           <a:latin typeface="Calibri" panose="020F0502020204030204" pitchFamily="34" charset="0"/>
                           <a:ea typeface="Calibri" panose="020F0502020204030204" pitchFamily="34" charset="0"/>
@@ -19641,7 +19877,7 @@
                         </a:rPr>
                         <a:t>11</a:t>
                       </a:r>
-                      <a:endParaRPr lang="en-US" sz="1100">
+                      <a:endParaRPr lang="en-US" sz="1100" dirty="0">
                         <a:effectLst/>
                         <a:latin typeface="Arial" panose="020B0604020202020204" pitchFamily="34" charset="0"/>
                         <a:ea typeface="Arial" panose="020B0604020202020204" pitchFamily="34" charset="0"/>
@@ -19704,7 +19940,7 @@
                         </a:spcAft>
                       </a:pPr>
                       <a:r>
-                        <a:rPr lang="en-US" sz="1100">
+                        <a:rPr lang="en-US" sz="1100" dirty="0">
                           <a:effectLst/>
                           <a:latin typeface="Calibri" panose="020F0502020204030204" pitchFamily="34" charset="0"/>
                           <a:ea typeface="Calibri" panose="020F0502020204030204" pitchFamily="34" charset="0"/>
@@ -19712,7 +19948,7 @@
                         </a:rPr>
                         <a:t>Indicator for Energy Star refrigerator</a:t>
                       </a:r>
-                      <a:endParaRPr lang="en-US" sz="1100">
+                      <a:endParaRPr lang="en-US" sz="1100" dirty="0">
                         <a:effectLst/>
                         <a:latin typeface="Arial" panose="020B0604020202020204" pitchFamily="34" charset="0"/>
                         <a:ea typeface="Arial" panose="020B0604020202020204" pitchFamily="34" charset="0"/>
@@ -19782,7 +20018,7 @@
                         </a:spcAft>
                       </a:pPr>
                       <a:r>
-                        <a:rPr lang="en-US" sz="1100">
+                        <a:rPr lang="en-US" sz="1100" dirty="0">
                           <a:effectLst/>
                           <a:latin typeface="Calibri" panose="020F0502020204030204" pitchFamily="34" charset="0"/>
                           <a:ea typeface="Calibri" panose="020F0502020204030204" pitchFamily="34" charset="0"/>
@@ -19790,7 +20026,7 @@
                         </a:rPr>
                         <a:t>12</a:t>
                       </a:r>
-                      <a:endParaRPr lang="en-US" sz="1100">
+                      <a:endParaRPr lang="en-US" sz="1100" dirty="0">
                         <a:effectLst/>
                         <a:latin typeface="Arial" panose="020B0604020202020204" pitchFamily="34" charset="0"/>
                         <a:ea typeface="Arial" panose="020B0604020202020204" pitchFamily="34" charset="0"/>
@@ -19853,7 +20089,7 @@
                         </a:spcAft>
                       </a:pPr>
                       <a:r>
-                        <a:rPr lang="en-US" sz="1100">
+                        <a:rPr lang="en-US" sz="1100" dirty="0">
                           <a:effectLst/>
                           <a:latin typeface="Calibri" panose="020F0502020204030204" pitchFamily="34" charset="0"/>
                           <a:ea typeface="Calibri" panose="020F0502020204030204" pitchFamily="34" charset="0"/>
@@ -19861,7 +20097,7 @@
                         </a:rPr>
                         <a:t>Indicator for swimming pool at household</a:t>
                       </a:r>
-                      <a:endParaRPr lang="en-US" sz="1100">
+                      <a:endParaRPr lang="en-US" sz="1100" dirty="0">
                         <a:effectLst/>
                         <a:latin typeface="Arial" panose="020B0604020202020204" pitchFamily="34" charset="0"/>
                         <a:ea typeface="Arial" panose="020B0604020202020204" pitchFamily="34" charset="0"/>
@@ -19931,7 +20167,7 @@
                         </a:spcAft>
                       </a:pPr>
                       <a:r>
-                        <a:rPr lang="en-US" sz="1100">
+                        <a:rPr lang="en-US" sz="1100" dirty="0">
                           <a:effectLst/>
                           <a:latin typeface="Calibri" panose="020F0502020204030204" pitchFamily="34" charset="0"/>
                           <a:ea typeface="Calibri" panose="020F0502020204030204" pitchFamily="34" charset="0"/>
@@ -19939,7 +20175,7 @@
                         </a:rPr>
                         <a:t>13</a:t>
                       </a:r>
-                      <a:endParaRPr lang="en-US" sz="1100">
+                      <a:endParaRPr lang="en-US" sz="1100" dirty="0">
                         <a:effectLst/>
                         <a:latin typeface="Arial" panose="020B0604020202020204" pitchFamily="34" charset="0"/>
                         <a:ea typeface="Arial" panose="020B0604020202020204" pitchFamily="34" charset="0"/>
@@ -20002,7 +20238,7 @@
                         </a:spcAft>
                       </a:pPr>
                       <a:r>
-                        <a:rPr lang="en-US" sz="1100">
+                        <a:rPr lang="en-US" sz="1100" dirty="0">
                           <a:effectLst/>
                           <a:latin typeface="Calibri" panose="020F0502020204030204" pitchFamily="34" charset="0"/>
                           <a:ea typeface="Calibri" panose="020F0502020204030204" pitchFamily="34" charset="0"/>
@@ -20010,7 +20246,7 @@
                         </a:rPr>
                         <a:t>Categorical indicator for studio apartment (N)</a:t>
                       </a:r>
-                      <a:endParaRPr lang="en-US" sz="1100">
+                      <a:endParaRPr lang="en-US" sz="1100" dirty="0">
                         <a:effectLst/>
                         <a:latin typeface="Arial" panose="020B0604020202020204" pitchFamily="34" charset="0"/>
                         <a:ea typeface="Arial" panose="020B0604020202020204" pitchFamily="34" charset="0"/>
@@ -20080,7 +20316,7 @@
                         </a:spcAft>
                       </a:pPr>
                       <a:r>
-                        <a:rPr lang="en-US" sz="1100">
+                        <a:rPr lang="en-US" sz="1100" dirty="0">
                           <a:effectLst/>
                           <a:latin typeface="Calibri" panose="020F0502020204030204" pitchFamily="34" charset="0"/>
                           <a:ea typeface="Calibri" panose="020F0502020204030204" pitchFamily="34" charset="0"/>
@@ -20088,7 +20324,7 @@
                         </a:rPr>
                         <a:t>14</a:t>
                       </a:r>
-                      <a:endParaRPr lang="en-US" sz="1100">
+                      <a:endParaRPr lang="en-US" sz="1100" dirty="0">
                         <a:effectLst/>
                         <a:latin typeface="Arial" panose="020B0604020202020204" pitchFamily="34" charset="0"/>
                         <a:ea typeface="Arial" panose="020B0604020202020204" pitchFamily="34" charset="0"/>
@@ -20151,7 +20387,7 @@
                         </a:spcAft>
                       </a:pPr>
                       <a:r>
-                        <a:rPr lang="en-US" sz="1100">
+                        <a:rPr lang="en-US" sz="1100" dirty="0">
                           <a:effectLst/>
                           <a:latin typeface="Calibri" panose="020F0502020204030204" pitchFamily="34" charset="0"/>
                           <a:ea typeface="Calibri" panose="020F0502020204030204" pitchFamily="34" charset="0"/>
@@ -20159,7 +20395,7 @@
                         </a:rPr>
                         <a:t>Use of natural gas for water heating</a:t>
                       </a:r>
-                      <a:endParaRPr lang="en-US" sz="1100">
+                      <a:endParaRPr lang="en-US" sz="1100" dirty="0">
                         <a:effectLst/>
                         <a:latin typeface="Arial" panose="020B0604020202020204" pitchFamily="34" charset="0"/>
                         <a:ea typeface="Arial" panose="020B0604020202020204" pitchFamily="34" charset="0"/>
@@ -20229,7 +20465,7 @@
                         </a:spcAft>
                       </a:pPr>
                       <a:r>
-                        <a:rPr lang="en-US" sz="1100">
+                        <a:rPr lang="en-US" sz="1100" dirty="0">
                           <a:effectLst/>
                           <a:latin typeface="Calibri" panose="020F0502020204030204" pitchFamily="34" charset="0"/>
                           <a:ea typeface="Calibri" panose="020F0502020204030204" pitchFamily="34" charset="0"/>
@@ -20237,7 +20473,7 @@
                         </a:rPr>
                         <a:t>15</a:t>
                       </a:r>
-                      <a:endParaRPr lang="en-US" sz="1100">
+                      <a:endParaRPr lang="en-US" sz="1100" dirty="0">
                         <a:effectLst/>
                         <a:latin typeface="Arial" panose="020B0604020202020204" pitchFamily="34" charset="0"/>
                         <a:ea typeface="Arial" panose="020B0604020202020204" pitchFamily="34" charset="0"/>
@@ -20906,7 +21142,18 @@
             </a:pPr>
             <a:r>
               <a:rPr lang="en-US" dirty="0"/>
-              <a:t>The model is useful for predicting total energy consumption for various types of households with accuracy that out performs less sophisticated methods</a:t>
+              <a:t>The model is useful for predicting total energy consumption for various types of households and can serve as a tool for customers and integrated into existing websites/software applications of utility companies</a:t>
+            </a:r>
+          </a:p>
+          <a:p>
+            <a:pPr>
+              <a:buClr>
+                <a:schemeClr val="accent2"/>
+              </a:buClr>
+            </a:pPr>
+            <a:r>
+              <a:rPr lang="en-US" dirty="0"/>
+              <a:t>This model has much greater accuracy than less sophisticated methods such as using the mean or median to predict consumption, thus making it practically and statistically significant</a:t>
             </a:r>
           </a:p>
           <a:p>
@@ -20918,61 +21165,6 @@
             <a:r>
               <a:rPr lang="en-US" dirty="0"/>
               <a:t>This model is not a finished product and can be further improved further to improve predictive power. </a:t>
-            </a:r>
-          </a:p>
-          <a:p>
-            <a:pPr>
-              <a:buClr>
-                <a:schemeClr val="accent2"/>
-              </a:buClr>
-            </a:pPr>
-            <a:r>
-              <a:rPr lang="en-US" dirty="0"/>
-              <a:t>Particular areas that may be explored in the future to improve upon the models discussed include: </a:t>
-            </a:r>
-          </a:p>
-          <a:p>
-            <a:pPr lvl="1">
-              <a:buClr>
-                <a:schemeClr val="accent2"/>
-              </a:buClr>
-            </a:pPr>
-            <a:r>
-              <a:rPr lang="en-US" dirty="0"/>
-              <a:t>More robust feature selection to eliminate noisy features</a:t>
-            </a:r>
-          </a:p>
-          <a:p>
-            <a:pPr lvl="1">
-              <a:buClr>
-                <a:schemeClr val="accent2"/>
-              </a:buClr>
-            </a:pPr>
-            <a:r>
-              <a:rPr lang="en-US" dirty="0"/>
-              <a:t>Tuning more parameters for ensemble models</a:t>
-            </a:r>
-          </a:p>
-          <a:p>
-            <a:pPr lvl="1">
-              <a:buClr>
-                <a:schemeClr val="accent2"/>
-              </a:buClr>
-            </a:pPr>
-            <a:r>
-              <a:rPr lang="en-US" dirty="0"/>
-              <a:t>Further investigation into the correlation between variables and their effects on the results</a:t>
-            </a:r>
-          </a:p>
-          <a:p>
-            <a:pPr lvl="1">
-              <a:buClr>
-                <a:schemeClr val="accent2"/>
-              </a:buClr>
-            </a:pPr>
-            <a:r>
-              <a:rPr lang="en-US" dirty="0"/>
-              <a:t>Incorporating more model classes that may perform better.</a:t>
             </a:r>
           </a:p>
           <a:p>
@@ -21409,7 +21601,7 @@
             </a:pPr>
             <a:r>
               <a:rPr lang="en-US" sz="2000" dirty="0"/>
-              <a:t>The sociopolitical effects of climate change are shifting the focus of energy sector. Utility companies are facing pressure to be more efficient and environmentally sustainable</a:t>
+              <a:t>The sociopolitical effects of climate change are shifting the focus of the energy sector. Utility companies are facing pressure to be more efficient and environmentally sustainable</a:t>
             </a:r>
           </a:p>
           <a:p>
@@ -22809,7 +23001,7 @@
             </a:pPr>
             <a:r>
               <a:rPr lang="en-US" sz="1800" dirty="0"/>
-              <a:t>The dataset contains 217 columns that represent imputation flags for 222 columns variables (some imputation flag columns correspond to multiple variables). These values were considered missing entries </a:t>
+              <a:t>The dataset contains 217 columns that represent imputation flags for 222 columns variables (some imputation flag columns correspond to multiple variables). </a:t>
             </a:r>
           </a:p>
           <a:p>
@@ -23449,10 +23641,9 @@
           <a:lstStyle/>
           <a:p>
             <a:r>
-              <a:rPr lang="en-US"/>
+              <a:rPr lang="en-US" dirty="0"/>
               <a:t>Add a footer</a:t>
             </a:r>
-            <a:endParaRPr lang="en-US" dirty="0"/>
           </a:p>
         </p:txBody>
       </p:sp>
@@ -24618,6 +24809,23 @@
 </file>
 
 <file path=customXml/item1.xml><?xml version="1.0" encoding="utf-8"?>
+<p:properties xmlns:p="http://schemas.microsoft.com/office/2006/metadata/properties" xmlns:xsi="http://www.w3.org/2001/XMLSchema-instance" xmlns:pc="http://schemas.microsoft.com/office/infopath/2007/PartnerControls">
+  <documentManagement>
+    <MediaServiceKeyPoints xmlns="71af3243-3dd4-4a8d-8c0d-dd76da1f02a5" xsi:nil="true"/>
+  </documentManagement>
+</p:properties>
+</file>
+
+<file path=customXml/item2.xml><?xml version="1.0" encoding="utf-8"?>
+<?mso-contentType ?>
+<FormTemplates xmlns="http://schemas.microsoft.com/sharepoint/v3/contenttype/forms">
+  <Display>DocumentLibraryForm</Display>
+  <Edit>DocumentLibraryForm</Edit>
+  <New>DocumentLibraryForm</New>
+</FormTemplates>
+</file>
+
+<file path=customXml/item3.xml><?xml version="1.0" encoding="utf-8"?>
 <ct:contentTypeSchema xmlns:ct="http://schemas.microsoft.com/office/2006/metadata/contentType" xmlns:ma="http://schemas.microsoft.com/office/2006/metadata/properties/metaAttributes" ct:_="" ma:_="" ma:contentTypeName="Document" ma:contentTypeID="0x01010079F111ED35F8CC479449609E8A0923A6" ma:contentTypeVersion="11" ma:contentTypeDescription="Create a new document." ma:contentTypeScope="" ma:versionID="96291512c1ee715ab617f4c07df79fc1">
   <xsd:schema xmlns:xsd="http://www.w3.org/2001/XMLSchema" xmlns:xs="http://www.w3.org/2001/XMLSchema" xmlns:p="http://schemas.microsoft.com/office/2006/metadata/properties" xmlns:ns2="71af3243-3dd4-4a8d-8c0d-dd76da1f02a5" xmlns:ns3="16c05727-aa75-4e4a-9b5f-8a80a1165891" targetNamespace="http://schemas.microsoft.com/office/2006/metadata/properties" ma:root="true" ma:fieldsID="8256c27c40ca5c40ce1cf6c44f0205df" ns2:_="" ns3:_="">
     <xsd:import namespace="71af3243-3dd4-4a8d-8c0d-dd76da1f02a5"/>
@@ -24828,24 +25036,25 @@
 </ct:contentTypeSchema>
 </file>
 
-<file path=customXml/item2.xml><?xml version="1.0" encoding="utf-8"?>
-<?mso-contentType ?>
-<FormTemplates xmlns="http://schemas.microsoft.com/sharepoint/v3/contenttype/forms">
-  <Display>DocumentLibraryForm</Display>
-  <Edit>DocumentLibraryForm</Edit>
-  <New>DocumentLibraryForm</New>
-</FormTemplates>
+<file path=customXml/itemProps1.xml><?xml version="1.0" encoding="utf-8"?>
+<ds:datastoreItem xmlns:ds="http://schemas.openxmlformats.org/officeDocument/2006/customXml" ds:itemID="{C87F4215-C6BB-44A3-9A5E-9446E6835900}">
+  <ds:schemaRefs>
+    <ds:schemaRef ds:uri="http://schemas.microsoft.com/office/2006/metadata/properties"/>
+    <ds:schemaRef ds:uri="http://schemas.microsoft.com/office/infopath/2007/PartnerControls"/>
+    <ds:schemaRef ds:uri="71af3243-3dd4-4a8d-8c0d-dd76da1f02a5"/>
+  </ds:schemaRefs>
+</ds:datastoreItem>
 </file>
 
-<file path=customXml/item3.xml><?xml version="1.0" encoding="utf-8"?>
-<p:properties xmlns:p="http://schemas.microsoft.com/office/2006/metadata/properties" xmlns:xsi="http://www.w3.org/2001/XMLSchema-instance" xmlns:pc="http://schemas.microsoft.com/office/infopath/2007/PartnerControls">
-  <documentManagement>
-    <MediaServiceKeyPoints xmlns="71af3243-3dd4-4a8d-8c0d-dd76da1f02a5" xsi:nil="true"/>
-  </documentManagement>
-</p:properties>
+<file path=customXml/itemProps2.xml><?xml version="1.0" encoding="utf-8"?>
+<ds:datastoreItem xmlns:ds="http://schemas.openxmlformats.org/officeDocument/2006/customXml" ds:itemID="{A80A5AF1-8C57-4290-936E-5FD27C957251}">
+  <ds:schemaRefs>
+    <ds:schemaRef ds:uri="http://schemas.microsoft.com/sharepoint/v3/contenttype/forms"/>
+  </ds:schemaRefs>
+</ds:datastoreItem>
 </file>
 
-<file path=customXml/itemProps1.xml><?xml version="1.0" encoding="utf-8"?>
+<file path=customXml/itemProps3.xml><?xml version="1.0" encoding="utf-8"?>
 <ds:datastoreItem xmlns:ds="http://schemas.openxmlformats.org/officeDocument/2006/customXml" ds:itemID="{8F8919DE-9BD9-47A9-9F5D-16EBB9687974}">
   <ds:schemaRefs>
     <ds:schemaRef ds:uri="http://schemas.microsoft.com/office/2006/metadata/contentType"/>
@@ -24862,22 +25071,4 @@
     <ds:schemaRef ds:uri="http://schemas.microsoft.com/internal/obd"/>
   </ds:schemaRefs>
 </ds:datastoreItem>
-</file>
-
-<file path=customXml/itemProps2.xml><?xml version="1.0" encoding="utf-8"?>
-<ds:datastoreItem xmlns:ds="http://schemas.openxmlformats.org/officeDocument/2006/customXml" ds:itemID="{A80A5AF1-8C57-4290-936E-5FD27C957251}">
-  <ds:schemaRefs>
-    <ds:schemaRef ds:uri="http://schemas.microsoft.com/sharepoint/v3/contenttype/forms"/>
-  </ds:schemaRefs>
-</ds:datastoreItem>
-</file>
-
-<file path=customXml/itemProps3.xml><?xml version="1.0" encoding="utf-8"?>
-<ds:datastoreItem xmlns:ds="http://schemas.openxmlformats.org/officeDocument/2006/customXml" ds:itemID="{C87F4215-C6BB-44A3-9A5E-9446E6835900}">
-  <ds:schemaRefs>
-    <ds:schemaRef ds:uri="http://schemas.microsoft.com/office/2006/metadata/properties"/>
-    <ds:schemaRef ds:uri="http://schemas.microsoft.com/office/infopath/2007/PartnerControls"/>
-    <ds:schemaRef ds:uri="71af3243-3dd4-4a8d-8c0d-dd76da1f02a5"/>
-  </ds:schemaRefs>
-</ds:datastoreItem>
 </file>
</xml_diff>